<commit_message>
Oppdaterte med logo for Hackathon
</commit_message>
<xml_diff>
--- a/docs/FHIR-faglig-forum/presentasjon/fagforum-logo.pptx
+++ b/docs/FHIR-faglig-forum/presentasjon/fagforum-logo.pptx
@@ -8,6 +8,7 @@
     <p:sldId id="256" r:id="rId2"/>
     <p:sldId id="257" r:id="rId3"/>
     <p:sldId id="258" r:id="rId4"/>
+    <p:sldId id="259" r:id="rId5"/>
   </p:sldIdLst>
   <p:sldSz cx="12192000" cy="6858000"/>
   <p:notesSz cx="6858000" cy="9144000"/>
@@ -320,7 +321,7 @@
           <a:p>
             <a:fld id="{4EFB23F9-26DD-4A10-B04B-0624FA430434}" type="datetimeFigureOut">
               <a:rPr lang="nb-NO" smtClean="0"/>
-              <a:t>24.05.2023</a:t>
+              <a:t>24.10.2025</a:t>
             </a:fld>
             <a:endParaRPr lang="nb-NO"/>
           </a:p>
@@ -518,7 +519,7 @@
           <a:p>
             <a:fld id="{4EFB23F9-26DD-4A10-B04B-0624FA430434}" type="datetimeFigureOut">
               <a:rPr lang="nb-NO" smtClean="0"/>
-              <a:t>24.05.2023</a:t>
+              <a:t>24.10.2025</a:t>
             </a:fld>
             <a:endParaRPr lang="nb-NO"/>
           </a:p>
@@ -726,7 +727,7 @@
           <a:p>
             <a:fld id="{4EFB23F9-26DD-4A10-B04B-0624FA430434}" type="datetimeFigureOut">
               <a:rPr lang="nb-NO" smtClean="0"/>
-              <a:t>24.05.2023</a:t>
+              <a:t>24.10.2025</a:t>
             </a:fld>
             <a:endParaRPr lang="nb-NO"/>
           </a:p>
@@ -924,7 +925,7 @@
           <a:p>
             <a:fld id="{4EFB23F9-26DD-4A10-B04B-0624FA430434}" type="datetimeFigureOut">
               <a:rPr lang="nb-NO" smtClean="0"/>
-              <a:t>24.05.2023</a:t>
+              <a:t>24.10.2025</a:t>
             </a:fld>
             <a:endParaRPr lang="nb-NO"/>
           </a:p>
@@ -1199,7 +1200,7 @@
           <a:p>
             <a:fld id="{4EFB23F9-26DD-4A10-B04B-0624FA430434}" type="datetimeFigureOut">
               <a:rPr lang="nb-NO" smtClean="0"/>
-              <a:t>24.05.2023</a:t>
+              <a:t>24.10.2025</a:t>
             </a:fld>
             <a:endParaRPr lang="nb-NO"/>
           </a:p>
@@ -1464,7 +1465,7 @@
           <a:p>
             <a:fld id="{4EFB23F9-26DD-4A10-B04B-0624FA430434}" type="datetimeFigureOut">
               <a:rPr lang="nb-NO" smtClean="0"/>
-              <a:t>24.05.2023</a:t>
+              <a:t>24.10.2025</a:t>
             </a:fld>
             <a:endParaRPr lang="nb-NO"/>
           </a:p>
@@ -1876,7 +1877,7 @@
           <a:p>
             <a:fld id="{4EFB23F9-26DD-4A10-B04B-0624FA430434}" type="datetimeFigureOut">
               <a:rPr lang="nb-NO" smtClean="0"/>
-              <a:t>24.05.2023</a:t>
+              <a:t>24.10.2025</a:t>
             </a:fld>
             <a:endParaRPr lang="nb-NO"/>
           </a:p>
@@ -2017,7 +2018,7 @@
           <a:p>
             <a:fld id="{4EFB23F9-26DD-4A10-B04B-0624FA430434}" type="datetimeFigureOut">
               <a:rPr lang="nb-NO" smtClean="0"/>
-              <a:t>24.05.2023</a:t>
+              <a:t>24.10.2025</a:t>
             </a:fld>
             <a:endParaRPr lang="nb-NO"/>
           </a:p>
@@ -2130,7 +2131,7 @@
           <a:p>
             <a:fld id="{4EFB23F9-26DD-4A10-B04B-0624FA430434}" type="datetimeFigureOut">
               <a:rPr lang="nb-NO" smtClean="0"/>
-              <a:t>24.05.2023</a:t>
+              <a:t>24.10.2025</a:t>
             </a:fld>
             <a:endParaRPr lang="nb-NO"/>
           </a:p>
@@ -2441,7 +2442,7 @@
           <a:p>
             <a:fld id="{4EFB23F9-26DD-4A10-B04B-0624FA430434}" type="datetimeFigureOut">
               <a:rPr lang="nb-NO" smtClean="0"/>
-              <a:t>24.05.2023</a:t>
+              <a:t>24.10.2025</a:t>
             </a:fld>
             <a:endParaRPr lang="nb-NO"/>
           </a:p>
@@ -2729,7 +2730,7 @@
           <a:p>
             <a:fld id="{4EFB23F9-26DD-4A10-B04B-0624FA430434}" type="datetimeFigureOut">
               <a:rPr lang="nb-NO" smtClean="0"/>
-              <a:t>24.05.2023</a:t>
+              <a:t>24.10.2025</a:t>
             </a:fld>
             <a:endParaRPr lang="nb-NO"/>
           </a:p>
@@ -2970,7 +2971,7 @@
           <a:p>
             <a:fld id="{4EFB23F9-26DD-4A10-B04B-0624FA430434}" type="datetimeFigureOut">
               <a:rPr lang="nb-NO" smtClean="0"/>
-              <a:t>24.05.2023</a:t>
+              <a:t>24.10.2025</a:t>
             </a:fld>
             <a:endParaRPr lang="nb-NO"/>
           </a:p>
@@ -3881,6 +3882,200 @@
 </p:sld>
 </file>
 
+<file path=ppt/slides/slide4.xml><?xml version="1.0" encoding="utf-8"?>
+<p:sld xmlns:a="http://schemas.openxmlformats.org/drawingml/2006/main" xmlns:r="http://schemas.openxmlformats.org/officeDocument/2006/relationships" xmlns:p="http://schemas.openxmlformats.org/presentationml/2006/main">
+  <p:cSld>
+    <p:spTree>
+      <p:nvGrpSpPr>
+        <p:cNvPr id="1" name="">
+          <a:extLst>
+            <a:ext uri="{FF2B5EF4-FFF2-40B4-BE49-F238E27FC236}">
+              <a16:creationId xmlns:a16="http://schemas.microsoft.com/office/drawing/2014/main" id="{A65ED6A8-B705-C813-F80D-CC4EE099AD2D}"/>
+            </a:ext>
+          </a:extLst>
+        </p:cNvPr>
+        <p:cNvGrpSpPr/>
+        <p:nvPr/>
+      </p:nvGrpSpPr>
+      <p:grpSpPr>
+        <a:xfrm>
+          <a:off x="0" y="0"/>
+          <a:ext cx="0" cy="0"/>
+          <a:chOff x="0" y="0"/>
+          <a:chExt cx="0" cy="0"/>
+        </a:xfrm>
+      </p:grpSpPr>
+      <p:sp>
+        <p:nvSpPr>
+          <p:cNvPr id="12" name="TekstSylinder 11">
+            <a:extLst>
+              <a:ext uri="{FF2B5EF4-FFF2-40B4-BE49-F238E27FC236}">
+                <a16:creationId xmlns:a16="http://schemas.microsoft.com/office/drawing/2014/main" id="{18599B7C-43FA-1FBF-D176-3B1567C80B5B}"/>
+              </a:ext>
+            </a:extLst>
+          </p:cNvPr>
+          <p:cNvSpPr txBox="1"/>
+          <p:nvPr/>
+        </p:nvSpPr>
+        <p:spPr>
+          <a:xfrm>
+            <a:off x="-814374" y="2594750"/>
+            <a:ext cx="4543795" cy="1938992"/>
+          </a:xfrm>
+          <a:prstGeom prst="rect">
+            <a:avLst/>
+          </a:prstGeom>
+          <a:noFill/>
+        </p:spPr>
+        <p:txBody>
+          <a:bodyPr wrap="square" rtlCol="0">
+            <a:spAutoFit/>
+          </a:bodyPr>
+          <a:lstStyle/>
+          <a:p>
+            <a:pPr algn="r"/>
+            <a:r>
+              <a:rPr lang="nb-NO" sz="12000" dirty="0">
+                <a:solidFill>
+                  <a:srgbClr val="EB2126"/>
+                </a:solidFill>
+                <a:latin typeface="Arial" panose="020B0604020202020204" pitchFamily="34" charset="0"/>
+                <a:cs typeface="Arial" panose="020B0604020202020204" pitchFamily="34" charset="0"/>
+              </a:rPr>
+              <a:t>FHIR</a:t>
+            </a:r>
+          </a:p>
+        </p:txBody>
+      </p:sp>
+      <p:sp>
+        <p:nvSpPr>
+          <p:cNvPr id="13" name="TekstSylinder 12">
+            <a:extLst>
+              <a:ext uri="{FF2B5EF4-FFF2-40B4-BE49-F238E27FC236}">
+                <a16:creationId xmlns:a16="http://schemas.microsoft.com/office/drawing/2014/main" id="{1587739C-E669-4762-B65F-2F6BD3D1668E}"/>
+              </a:ext>
+            </a:extLst>
+          </p:cNvPr>
+          <p:cNvSpPr txBox="1"/>
+          <p:nvPr/>
+        </p:nvSpPr>
+        <p:spPr>
+          <a:xfrm>
+            <a:off x="4643821" y="2594750"/>
+            <a:ext cx="7893762" cy="1938992"/>
+          </a:xfrm>
+          <a:prstGeom prst="rect">
+            <a:avLst/>
+          </a:prstGeom>
+          <a:noFill/>
+        </p:spPr>
+        <p:txBody>
+          <a:bodyPr wrap="square" rtlCol="0">
+            <a:spAutoFit/>
+          </a:bodyPr>
+          <a:lstStyle/>
+          <a:p>
+            <a:r>
+              <a:rPr lang="nb-NO" sz="12000" dirty="0" err="1">
+                <a:latin typeface="Arial" panose="020B0604020202020204" pitchFamily="34" charset="0"/>
+                <a:cs typeface="Arial" panose="020B0604020202020204" pitchFamily="34" charset="0"/>
+              </a:rPr>
+              <a:t>Hackathon</a:t>
+            </a:r>
+            <a:endParaRPr lang="nb-NO" sz="12000" dirty="0">
+              <a:latin typeface="Arial" panose="020B0604020202020204" pitchFamily="34" charset="0"/>
+              <a:cs typeface="Arial" panose="020B0604020202020204" pitchFamily="34" charset="0"/>
+            </a:endParaRPr>
+          </a:p>
+        </p:txBody>
+      </p:sp>
+      <p:pic>
+        <p:nvPicPr>
+          <p:cNvPr id="5" name="Plassholder for innhold 4" descr="Tilkoblinger med heldekkende fyll">
+            <a:extLst>
+              <a:ext uri="{FF2B5EF4-FFF2-40B4-BE49-F238E27FC236}">
+                <a16:creationId xmlns:a16="http://schemas.microsoft.com/office/drawing/2014/main" id="{AB9C5932-BE6D-31B3-E2EF-7A9157AEDF8D}"/>
+              </a:ext>
+            </a:extLst>
+          </p:cNvPr>
+          <p:cNvPicPr>
+            <a:picLocks noGrp="1" noChangeAspect="1"/>
+          </p:cNvPicPr>
+          <p:nvPr>
+            <p:ph idx="1"/>
+          </p:nvPr>
+        </p:nvPicPr>
+        <p:blipFill>
+          <a:blip r:embed="rId2">
+            <a:extLst>
+              <a:ext uri="{28A0092B-C50C-407E-A947-70E740481C1C}">
+                <a14:useLocalDpi xmlns:a14="http://schemas.microsoft.com/office/drawing/2010/main" val="0"/>
+              </a:ext>
+              <a:ext uri="{96DAC541-7B7A-43D3-8B79-37D633B846F1}">
+                <asvg:svgBlip xmlns:asvg="http://schemas.microsoft.com/office/drawing/2016/SVG/main" r:embed="rId3"/>
+              </a:ext>
+            </a:extLst>
+          </a:blip>
+          <a:stretch>
+            <a:fillRect/>
+          </a:stretch>
+        </p:blipFill>
+        <p:spPr>
+          <a:xfrm>
+            <a:off x="3729421" y="2924170"/>
+            <a:ext cx="789024" cy="789024"/>
+          </a:xfrm>
+        </p:spPr>
+      </p:pic>
+      <p:pic>
+        <p:nvPicPr>
+          <p:cNvPr id="3" name="Grafikk 2" descr="Programmere mann med heldekkende fyll">
+            <a:extLst>
+              <a:ext uri="{FF2B5EF4-FFF2-40B4-BE49-F238E27FC236}">
+                <a16:creationId xmlns:a16="http://schemas.microsoft.com/office/drawing/2014/main" id="{F1837BA2-CCE6-124C-A94E-D2621F894320}"/>
+              </a:ext>
+            </a:extLst>
+          </p:cNvPr>
+          <p:cNvPicPr>
+            <a:picLocks noChangeAspect="1"/>
+          </p:cNvPicPr>
+          <p:nvPr/>
+        </p:nvPicPr>
+        <p:blipFill>
+          <a:blip r:embed="rId4">
+            <a:extLst>
+              <a:ext uri="{96DAC541-7B7A-43D3-8B79-37D633B846F1}">
+                <asvg:svgBlip xmlns:asvg="http://schemas.microsoft.com/office/drawing/2016/SVG/main" r:embed="rId5"/>
+              </a:ext>
+            </a:extLst>
+          </a:blip>
+          <a:stretch>
+            <a:fillRect/>
+          </a:stretch>
+        </p:blipFill>
+        <p:spPr>
+          <a:xfrm>
+            <a:off x="3954776" y="3466266"/>
+            <a:ext cx="734146" cy="734146"/>
+          </a:xfrm>
+          <a:prstGeom prst="rect">
+            <a:avLst/>
+          </a:prstGeom>
+        </p:spPr>
+      </p:pic>
+    </p:spTree>
+    <p:extLst>
+      <p:ext uri="{BB962C8B-B14F-4D97-AF65-F5344CB8AC3E}">
+        <p14:creationId xmlns:p14="http://schemas.microsoft.com/office/powerpoint/2010/main" val="2869826813"/>
+      </p:ext>
+    </p:extLst>
+  </p:cSld>
+  <p:clrMapOvr>
+    <a:masterClrMapping/>
+  </p:clrMapOvr>
+</p:sld>
+</file>
+
 <file path=ppt/theme/theme1.xml><?xml version="1.0" encoding="utf-8"?>
 <a:theme xmlns:a="http://schemas.openxmlformats.org/drawingml/2006/main" name="Office-tema">
   <a:themeElements>

</xml_diff>